<commit_message>
GUI is working, can merge csv files
</commit_message>
<xml_diff>
--- a/csv_to_PivotChart_NOTES.pptx
+++ b/csv_to_PivotChart_NOTES.pptx
@@ -106,6 +106,11 @@
       </a:defRPr>
     </a:lvl9pPr>
   </p:defaultTextStyle>
+  <p:extLst>
+    <p:ext uri="{EFAFB233-063F-42B5-8137-9DF3F51BA10A}">
+      <p15:sldGuideLst xmlns:p15="http://schemas.microsoft.com/office/powerpoint/2012/main"/>
+    </p:ext>
+  </p:extLst>
 </p:presentation>
 </file>
 
@@ -258,7 +263,7 @@
           <a:p>
             <a:fld id="{4F9B30E3-CC1D-4CC3-AF8B-A244CC5F29C7}" type="datetimeFigureOut">
               <a:rPr lang="en-PH" smtClean="0"/>
-              <a:t>10/18/2025</a:t>
+              <a:t>10/19/2025</a:t>
             </a:fld>
             <a:endParaRPr lang="en-PH"/>
           </a:p>
@@ -458,7 +463,7 @@
           <a:p>
             <a:fld id="{4F9B30E3-CC1D-4CC3-AF8B-A244CC5F29C7}" type="datetimeFigureOut">
               <a:rPr lang="en-PH" smtClean="0"/>
-              <a:t>10/18/2025</a:t>
+              <a:t>10/19/2025</a:t>
             </a:fld>
             <a:endParaRPr lang="en-PH"/>
           </a:p>
@@ -668,7 +673,7 @@
           <a:p>
             <a:fld id="{4F9B30E3-CC1D-4CC3-AF8B-A244CC5F29C7}" type="datetimeFigureOut">
               <a:rPr lang="en-PH" smtClean="0"/>
-              <a:t>10/18/2025</a:t>
+              <a:t>10/19/2025</a:t>
             </a:fld>
             <a:endParaRPr lang="en-PH"/>
           </a:p>
@@ -868,7 +873,7 @@
           <a:p>
             <a:fld id="{4F9B30E3-CC1D-4CC3-AF8B-A244CC5F29C7}" type="datetimeFigureOut">
               <a:rPr lang="en-PH" smtClean="0"/>
-              <a:t>10/18/2025</a:t>
+              <a:t>10/19/2025</a:t>
             </a:fld>
             <a:endParaRPr lang="en-PH"/>
           </a:p>
@@ -1144,7 +1149,7 @@
           <a:p>
             <a:fld id="{4F9B30E3-CC1D-4CC3-AF8B-A244CC5F29C7}" type="datetimeFigureOut">
               <a:rPr lang="en-PH" smtClean="0"/>
-              <a:t>10/18/2025</a:t>
+              <a:t>10/19/2025</a:t>
             </a:fld>
             <a:endParaRPr lang="en-PH"/>
           </a:p>
@@ -1412,7 +1417,7 @@
           <a:p>
             <a:fld id="{4F9B30E3-CC1D-4CC3-AF8B-A244CC5F29C7}" type="datetimeFigureOut">
               <a:rPr lang="en-PH" smtClean="0"/>
-              <a:t>10/18/2025</a:t>
+              <a:t>10/19/2025</a:t>
             </a:fld>
             <a:endParaRPr lang="en-PH"/>
           </a:p>
@@ -1827,7 +1832,7 @@
           <a:p>
             <a:fld id="{4F9B30E3-CC1D-4CC3-AF8B-A244CC5F29C7}" type="datetimeFigureOut">
               <a:rPr lang="en-PH" smtClean="0"/>
-              <a:t>10/18/2025</a:t>
+              <a:t>10/19/2025</a:t>
             </a:fld>
             <a:endParaRPr lang="en-PH"/>
           </a:p>
@@ -1969,7 +1974,7 @@
           <a:p>
             <a:fld id="{4F9B30E3-CC1D-4CC3-AF8B-A244CC5F29C7}" type="datetimeFigureOut">
               <a:rPr lang="en-PH" smtClean="0"/>
-              <a:t>10/18/2025</a:t>
+              <a:t>10/19/2025</a:t>
             </a:fld>
             <a:endParaRPr lang="en-PH"/>
           </a:p>
@@ -2082,7 +2087,7 @@
           <a:p>
             <a:fld id="{4F9B30E3-CC1D-4CC3-AF8B-A244CC5F29C7}" type="datetimeFigureOut">
               <a:rPr lang="en-PH" smtClean="0"/>
-              <a:t>10/18/2025</a:t>
+              <a:t>10/19/2025</a:t>
             </a:fld>
             <a:endParaRPr lang="en-PH"/>
           </a:p>
@@ -2395,7 +2400,7 @@
           <a:p>
             <a:fld id="{4F9B30E3-CC1D-4CC3-AF8B-A244CC5F29C7}" type="datetimeFigureOut">
               <a:rPr lang="en-PH" smtClean="0"/>
-              <a:t>10/18/2025</a:t>
+              <a:t>10/19/2025</a:t>
             </a:fld>
             <a:endParaRPr lang="en-PH"/>
           </a:p>
@@ -2684,7 +2689,7 @@
           <a:p>
             <a:fld id="{4F9B30E3-CC1D-4CC3-AF8B-A244CC5F29C7}" type="datetimeFigureOut">
               <a:rPr lang="en-PH" smtClean="0"/>
-              <a:t>10/18/2025</a:t>
+              <a:t>10/19/2025</a:t>
             </a:fld>
             <a:endParaRPr lang="en-PH"/>
           </a:p>
@@ -2927,7 +2932,7 @@
           <a:p>
             <a:fld id="{4F9B30E3-CC1D-4CC3-AF8B-A244CC5F29C7}" type="datetimeFigureOut">
               <a:rPr lang="en-PH" smtClean="0"/>
-              <a:t>10/18/2025</a:t>
+              <a:t>10/19/2025</a:t>
             </a:fld>
             <a:endParaRPr lang="en-PH"/>
           </a:p>
@@ -3364,6 +3369,11 @@
           <a:prstGeom prst="rect">
             <a:avLst/>
           </a:prstGeom>
+          <a:ln>
+            <a:solidFill>
+              <a:schemeClr val="bg1"/>
+            </a:solidFill>
+          </a:ln>
         </p:spPr>
         <p:style>
           <a:lnRef idx="2">
@@ -3410,6 +3420,11 @@
           <a:prstGeom prst="rect">
             <a:avLst/>
           </a:prstGeom>
+          <a:ln>
+            <a:solidFill>
+              <a:schemeClr val="bg1"/>
+            </a:solidFill>
+          </a:ln>
         </p:spPr>
         <p:style>
           <a:lnRef idx="2">
@@ -3456,6 +3471,11 @@
           <a:prstGeom prst="rect">
             <a:avLst/>
           </a:prstGeom>
+          <a:ln>
+            <a:solidFill>
+              <a:schemeClr val="bg1"/>
+            </a:solidFill>
+          </a:ln>
         </p:spPr>
         <p:style>
           <a:lnRef idx="2">
@@ -3502,6 +3522,11 @@
           <a:prstGeom prst="rect">
             <a:avLst/>
           </a:prstGeom>
+          <a:ln>
+            <a:solidFill>
+              <a:schemeClr val="bg1"/>
+            </a:solidFill>
+          </a:ln>
         </p:spPr>
         <p:style>
           <a:lnRef idx="2">
@@ -3548,6 +3573,11 @@
           <a:prstGeom prst="rect">
             <a:avLst/>
           </a:prstGeom>
+          <a:ln>
+            <a:solidFill>
+              <a:schemeClr val="bg1"/>
+            </a:solidFill>
+          </a:ln>
         </p:spPr>
         <p:style>
           <a:lnRef idx="2">
@@ -3594,6 +3624,11 @@
           <a:prstGeom prst="rect">
             <a:avLst/>
           </a:prstGeom>
+          <a:ln>
+            <a:solidFill>
+              <a:schemeClr val="bg1"/>
+            </a:solidFill>
+          </a:ln>
         </p:spPr>
         <p:style>
           <a:lnRef idx="2">
@@ -3640,6 +3675,11 @@
           <a:prstGeom prst="rect">
             <a:avLst/>
           </a:prstGeom>
+          <a:ln>
+            <a:solidFill>
+              <a:schemeClr val="bg1"/>
+            </a:solidFill>
+          </a:ln>
         </p:spPr>
         <p:style>
           <a:lnRef idx="2">
@@ -3686,6 +3726,11 @@
           <a:prstGeom prst="rect">
             <a:avLst/>
           </a:prstGeom>
+          <a:ln>
+            <a:solidFill>
+              <a:schemeClr val="bg1"/>
+            </a:solidFill>
+          </a:ln>
         </p:spPr>
         <p:style>
           <a:lnRef idx="2">
@@ -3732,6 +3777,11 @@
           <a:prstGeom prst="rect">
             <a:avLst/>
           </a:prstGeom>
+          <a:ln>
+            <a:solidFill>
+              <a:schemeClr val="bg1"/>
+            </a:solidFill>
+          </a:ln>
         </p:spPr>
         <p:style>
           <a:lnRef idx="2">
@@ -3778,6 +3828,11 @@
           <a:prstGeom prst="rect">
             <a:avLst/>
           </a:prstGeom>
+          <a:ln>
+            <a:solidFill>
+              <a:schemeClr val="bg1"/>
+            </a:solidFill>
+          </a:ln>
         </p:spPr>
         <p:style>
           <a:lnRef idx="2">
@@ -3824,6 +3879,11 @@
           <a:prstGeom prst="rect">
             <a:avLst/>
           </a:prstGeom>
+          <a:ln>
+            <a:solidFill>
+              <a:schemeClr val="bg1"/>
+            </a:solidFill>
+          </a:ln>
         </p:spPr>
         <p:style>
           <a:lnRef idx="2">
@@ -3864,7 +3924,7 @@
         </p:nvSpPr>
         <p:spPr>
           <a:xfrm>
-            <a:off x="8413533" y="1458356"/>
+            <a:off x="8492362" y="1516148"/>
             <a:ext cx="1408386" cy="523220"/>
           </a:xfrm>
           <a:prstGeom prst="rect">
@@ -3873,7 +3933,7 @@
           <a:noFill/>
           <a:ln>
             <a:solidFill>
-              <a:schemeClr val="tx1"/>
+              <a:schemeClr val="bg1"/>
             </a:solidFill>
           </a:ln>
         </p:spPr>
@@ -3894,10 +3954,10 @@
       </p:sp>
       <p:sp>
         <p:nvSpPr>
-          <p:cNvPr id="16" name="TextBox 15">
-            <a:extLst>
-              <a:ext uri="{FF2B5EF4-FFF2-40B4-BE49-F238E27FC236}">
-                <a16:creationId xmlns:a16="http://schemas.microsoft.com/office/drawing/2014/main" id="{8A144714-69C2-ECC2-0922-CDC57FBDFEC8}"/>
+          <p:cNvPr id="17" name="TextBox 16">
+            <a:extLst>
+              <a:ext uri="{FF2B5EF4-FFF2-40B4-BE49-F238E27FC236}">
+                <a16:creationId xmlns:a16="http://schemas.microsoft.com/office/drawing/2014/main" id="{DEA2182C-8B51-BD19-D924-04F4DABD62C5}"/>
               </a:ext>
             </a:extLst>
           </p:cNvPr>
@@ -3906,8 +3966,8 @@
         </p:nvSpPr>
         <p:spPr>
           <a:xfrm>
-            <a:off x="10152996" y="1455774"/>
-            <a:ext cx="1408386" cy="523220"/>
+            <a:off x="882867" y="937371"/>
+            <a:ext cx="2816773" cy="276999"/>
           </a:xfrm>
           <a:prstGeom prst="rect">
             <a:avLst/>
@@ -3915,7 +3975,7 @@
           <a:noFill/>
           <a:ln>
             <a:solidFill>
-              <a:schemeClr val="tx1"/>
+              <a:schemeClr val="bg1"/>
             </a:solidFill>
           </a:ln>
         </p:spPr>
@@ -3925,21 +3985,20 @@
           </a:bodyPr>
           <a:lstStyle/>
           <a:p>
-            <a:pPr algn="ctr"/>
-            <a:r>
-              <a:rPr lang="en-US" sz="2800" dirty="0"/>
-              <a:t>Update</a:t>
-            </a:r>
-            <a:endParaRPr lang="en-PH" sz="2800" dirty="0"/>
-          </a:p>
-        </p:txBody>
-      </p:sp>
-      <p:sp>
-        <p:nvSpPr>
-          <p:cNvPr id="17" name="TextBox 16">
-            <a:extLst>
-              <a:ext uri="{FF2B5EF4-FFF2-40B4-BE49-F238E27FC236}">
-                <a16:creationId xmlns:a16="http://schemas.microsoft.com/office/drawing/2014/main" id="{DEA2182C-8B51-BD19-D924-04F4DABD62C5}"/>
+            <a:r>
+              <a:rPr lang="en-US" sz="1200" b="1" dirty="0"/>
+              <a:t>Group: All csv file inside this folder</a:t>
+            </a:r>
+            <a:endParaRPr lang="en-PH" sz="1200" b="1" dirty="0"/>
+          </a:p>
+        </p:txBody>
+      </p:sp>
+      <p:sp>
+        <p:nvSpPr>
+          <p:cNvPr id="18" name="TextBox 17">
+            <a:extLst>
+              <a:ext uri="{FF2B5EF4-FFF2-40B4-BE49-F238E27FC236}">
+                <a16:creationId xmlns:a16="http://schemas.microsoft.com/office/drawing/2014/main" id="{D72A7B0C-1844-8961-E3A5-7A4488148E06}"/>
               </a:ext>
             </a:extLst>
           </p:cNvPr>
@@ -3948,13 +4007,18 @@
         </p:nvSpPr>
         <p:spPr>
           <a:xfrm>
-            <a:off x="882867" y="937371"/>
-            <a:ext cx="2816773" cy="307777"/>
+            <a:off x="882867" y="1762376"/>
+            <a:ext cx="2816773" cy="276999"/>
           </a:xfrm>
           <a:prstGeom prst="rect">
             <a:avLst/>
           </a:prstGeom>
           <a:noFill/>
+          <a:ln>
+            <a:solidFill>
+              <a:schemeClr val="bg1"/>
+            </a:solidFill>
+          </a:ln>
         </p:spPr>
         <p:txBody>
           <a:bodyPr wrap="square" rtlCol="0">
@@ -3963,69 +4027,38 @@
           <a:lstStyle/>
           <a:p>
             <a:r>
-              <a:rPr lang="en-US" sz="1400" b="1" dirty="0"/>
-              <a:t>Group: All csv file inside this folder</a:t>
-            </a:r>
-            <a:endParaRPr lang="en-PH" sz="1400" b="1" dirty="0"/>
-          </a:p>
-        </p:txBody>
-      </p:sp>
-      <p:sp>
-        <p:nvSpPr>
-          <p:cNvPr id="18" name="TextBox 17">
-            <a:extLst>
-              <a:ext uri="{FF2B5EF4-FFF2-40B4-BE49-F238E27FC236}">
-                <a16:creationId xmlns:a16="http://schemas.microsoft.com/office/drawing/2014/main" id="{D72A7B0C-1844-8961-E3A5-7A4488148E06}"/>
-              </a:ext>
-            </a:extLst>
-          </p:cNvPr>
-          <p:cNvSpPr txBox="1"/>
+              <a:rPr lang="en-US" sz="1200" b="1" dirty="0"/>
+              <a:t>Individual: Only this csv files</a:t>
+            </a:r>
+            <a:endParaRPr lang="en-PH" sz="1200" b="1" dirty="0"/>
+          </a:p>
+        </p:txBody>
+      </p:sp>
+      <p:sp>
+        <p:nvSpPr>
+          <p:cNvPr id="20" name="Rectangle 19">
+            <a:extLst>
+              <a:ext uri="{FF2B5EF4-FFF2-40B4-BE49-F238E27FC236}">
+                <a16:creationId xmlns:a16="http://schemas.microsoft.com/office/drawing/2014/main" id="{98D9C196-14C1-5253-1015-042D05DBD24D}"/>
+              </a:ext>
+            </a:extLst>
+          </p:cNvPr>
+          <p:cNvSpPr/>
           <p:nvPr/>
         </p:nvSpPr>
         <p:spPr>
           <a:xfrm>
-            <a:off x="882867" y="1762376"/>
-            <a:ext cx="2816773" cy="307777"/>
-          </a:xfrm>
-          <a:prstGeom prst="rect">
-            <a:avLst/>
-          </a:prstGeom>
-          <a:noFill/>
-        </p:spPr>
-        <p:txBody>
-          <a:bodyPr wrap="square" rtlCol="0">
-            <a:spAutoFit/>
-          </a:bodyPr>
-          <a:lstStyle/>
-          <a:p>
-            <a:r>
-              <a:rPr lang="en-US" sz="1400" b="1" dirty="0"/>
-              <a:t>Individual: Only this csv files</a:t>
-            </a:r>
-            <a:endParaRPr lang="en-PH" sz="1400" b="1" dirty="0"/>
-          </a:p>
-        </p:txBody>
-      </p:sp>
-      <p:sp>
-        <p:nvSpPr>
-          <p:cNvPr id="20" name="Rectangle 19">
-            <a:extLst>
-              <a:ext uri="{FF2B5EF4-FFF2-40B4-BE49-F238E27FC236}">
-                <a16:creationId xmlns:a16="http://schemas.microsoft.com/office/drawing/2014/main" id="{98D9C196-14C1-5253-1015-042D05DBD24D}"/>
-              </a:ext>
-            </a:extLst>
-          </p:cNvPr>
-          <p:cNvSpPr/>
-          <p:nvPr/>
-        </p:nvSpPr>
-        <p:spPr>
-          <a:xfrm>
-            <a:off x="4645573" y="1586275"/>
+            <a:off x="4616669" y="1666251"/>
             <a:ext cx="3179380" cy="278156"/>
           </a:xfrm>
           <a:prstGeom prst="rect">
             <a:avLst/>
           </a:prstGeom>
+          <a:ln>
+            <a:solidFill>
+              <a:schemeClr val="bg1"/>
+            </a:solidFill>
+          </a:ln>
         </p:spPr>
         <p:style>
           <a:lnRef idx="2">
@@ -4066,13 +4099,18 @@
         </p:nvSpPr>
         <p:spPr>
           <a:xfrm>
-            <a:off x="4550980" y="1229710"/>
-            <a:ext cx="2448910" cy="369332"/>
+            <a:off x="4522076" y="1309686"/>
+            <a:ext cx="2448910" cy="338554"/>
           </a:xfrm>
           <a:prstGeom prst="rect">
             <a:avLst/>
           </a:prstGeom>
           <a:noFill/>
+          <a:ln>
+            <a:solidFill>
+              <a:schemeClr val="bg1"/>
+            </a:solidFill>
+          </a:ln>
         </p:spPr>
         <p:txBody>
           <a:bodyPr wrap="square" rtlCol="0">
@@ -4081,10 +4119,10 @@
           <a:lstStyle/>
           <a:p>
             <a:r>
-              <a:rPr lang="en-US" b="1" dirty="0"/>
+              <a:rPr lang="en-US" sz="1600" dirty="0"/>
               <a:t>Output xlsx filename</a:t>
             </a:r>
-            <a:endParaRPr lang="en-PH" b="1" dirty="0"/>
+            <a:endParaRPr lang="en-PH" sz="1600" dirty="0"/>
           </a:p>
         </p:txBody>
       </p:sp>
@@ -4109,6 +4147,11 @@
             <a:avLst/>
           </a:prstGeom>
           <a:noFill/>
+          <a:ln>
+            <a:solidFill>
+              <a:schemeClr val="bg1"/>
+            </a:solidFill>
+          </a:ln>
         </p:spPr>
         <p:txBody>
           <a:bodyPr wrap="square" rtlCol="0">
@@ -4142,13 +4185,18 @@
         </p:nvSpPr>
         <p:spPr>
           <a:xfrm>
-            <a:off x="6768663" y="3227070"/>
+            <a:off x="6295697" y="4829502"/>
             <a:ext cx="1891861" cy="461665"/>
           </a:xfrm>
           <a:prstGeom prst="rect">
             <a:avLst/>
           </a:prstGeom>
           <a:noFill/>
+          <a:ln>
+            <a:solidFill>
+              <a:schemeClr val="bg1"/>
+            </a:solidFill>
+          </a:ln>
         </p:spPr>
         <p:txBody>
           <a:bodyPr wrap="square" rtlCol="0">
@@ -4161,6 +4209,307 @@
               <a:t>STATISTICS</a:t>
             </a:r>
             <a:endParaRPr lang="en-PH" sz="2400" b="1" dirty="0"/>
+          </a:p>
+        </p:txBody>
+      </p:sp>
+      <p:sp>
+        <p:nvSpPr>
+          <p:cNvPr id="2" name="Rectangle 1">
+            <a:extLst>
+              <a:ext uri="{FF2B5EF4-FFF2-40B4-BE49-F238E27FC236}">
+                <a16:creationId xmlns:a16="http://schemas.microsoft.com/office/drawing/2014/main" id="{28BF4FC4-D0A6-A5F3-C912-6820C01016F6}"/>
+              </a:ext>
+            </a:extLst>
+          </p:cNvPr>
+          <p:cNvSpPr/>
+          <p:nvPr/>
+        </p:nvSpPr>
+        <p:spPr>
+          <a:xfrm>
+            <a:off x="4616669" y="2638097"/>
+            <a:ext cx="3097925" cy="1216571"/>
+          </a:xfrm>
+          <a:prstGeom prst="rect">
+            <a:avLst/>
+          </a:prstGeom>
+          <a:ln>
+            <a:solidFill>
+              <a:schemeClr val="bg1"/>
+            </a:solidFill>
+          </a:ln>
+        </p:spPr>
+        <p:style>
+          <a:lnRef idx="2">
+            <a:schemeClr val="accent1">
+              <a:shade val="15000"/>
+            </a:schemeClr>
+          </a:lnRef>
+          <a:fillRef idx="1">
+            <a:schemeClr val="accent1"/>
+          </a:fillRef>
+          <a:effectRef idx="0">
+            <a:schemeClr val="accent1"/>
+          </a:effectRef>
+          <a:fontRef idx="minor">
+            <a:schemeClr val="lt1"/>
+          </a:fontRef>
+        </p:style>
+        <p:txBody>
+          <a:bodyPr rtlCol="0" anchor="ctr"/>
+          <a:lstStyle/>
+          <a:p>
+            <a:pPr algn="ctr"/>
+            <a:endParaRPr lang="en-PH"/>
+          </a:p>
+        </p:txBody>
+      </p:sp>
+      <p:sp>
+        <p:nvSpPr>
+          <p:cNvPr id="3" name="TextBox 2">
+            <a:extLst>
+              <a:ext uri="{FF2B5EF4-FFF2-40B4-BE49-F238E27FC236}">
+                <a16:creationId xmlns:a16="http://schemas.microsoft.com/office/drawing/2014/main" id="{AC055BB8-DB92-A838-26AB-0AE7BD7CADFD}"/>
+              </a:ext>
+            </a:extLst>
+          </p:cNvPr>
+          <p:cNvSpPr txBox="1"/>
+          <p:nvPr/>
+        </p:nvSpPr>
+        <p:spPr>
+          <a:xfrm>
+            <a:off x="4616669" y="2289033"/>
+            <a:ext cx="1679028" cy="338554"/>
+          </a:xfrm>
+          <a:prstGeom prst="rect">
+            <a:avLst/>
+          </a:prstGeom>
+          <a:noFill/>
+          <a:ln>
+            <a:solidFill>
+              <a:schemeClr val="bg1"/>
+            </a:solidFill>
+          </a:ln>
+        </p:spPr>
+        <p:txBody>
+          <a:bodyPr wrap="square" rtlCol="0">
+            <a:spAutoFit/>
+          </a:bodyPr>
+          <a:lstStyle/>
+          <a:p>
+            <a:r>
+              <a:rPr lang="en-US" sz="1600" dirty="0"/>
+              <a:t>Pivot Chart</a:t>
+            </a:r>
+            <a:endParaRPr lang="en-PH" sz="1600" dirty="0"/>
+          </a:p>
+        </p:txBody>
+      </p:sp>
+      <p:sp>
+        <p:nvSpPr>
+          <p:cNvPr id="19" name="TextBox 18">
+            <a:extLst>
+              <a:ext uri="{FF2B5EF4-FFF2-40B4-BE49-F238E27FC236}">
+                <a16:creationId xmlns:a16="http://schemas.microsoft.com/office/drawing/2014/main" id="{02AEF7B1-898A-F6F1-9F34-F54A477736E4}"/>
+              </a:ext>
+            </a:extLst>
+          </p:cNvPr>
+          <p:cNvSpPr txBox="1"/>
+          <p:nvPr/>
+        </p:nvSpPr>
+        <p:spPr>
+          <a:xfrm>
+            <a:off x="8492362" y="2969578"/>
+            <a:ext cx="1408386" cy="523220"/>
+          </a:xfrm>
+          <a:prstGeom prst="rect">
+            <a:avLst/>
+          </a:prstGeom>
+          <a:noFill/>
+          <a:ln>
+            <a:solidFill>
+              <a:schemeClr val="bg1"/>
+            </a:solidFill>
+          </a:ln>
+        </p:spPr>
+        <p:txBody>
+          <a:bodyPr wrap="square" rtlCol="0">
+            <a:spAutoFit/>
+          </a:bodyPr>
+          <a:lstStyle/>
+          <a:p>
+            <a:pPr algn="ctr"/>
+            <a:r>
+              <a:rPr lang="en-US" sz="2800" dirty="0"/>
+              <a:t>Create </a:t>
+            </a:r>
+            <a:endParaRPr lang="en-PH" sz="2800" dirty="0"/>
+          </a:p>
+        </p:txBody>
+      </p:sp>
+      <p:sp>
+        <p:nvSpPr>
+          <p:cNvPr id="24" name="TextBox 23">
+            <a:extLst>
+              <a:ext uri="{FF2B5EF4-FFF2-40B4-BE49-F238E27FC236}">
+                <a16:creationId xmlns:a16="http://schemas.microsoft.com/office/drawing/2014/main" id="{D7C9C3D0-DAF3-C79C-26C0-4456C696BC42}"/>
+              </a:ext>
+            </a:extLst>
+          </p:cNvPr>
+          <p:cNvSpPr txBox="1"/>
+          <p:nvPr/>
+        </p:nvSpPr>
+        <p:spPr>
+          <a:xfrm>
+            <a:off x="10184525" y="1500766"/>
+            <a:ext cx="1408386" cy="523220"/>
+          </a:xfrm>
+          <a:prstGeom prst="rect">
+            <a:avLst/>
+          </a:prstGeom>
+          <a:noFill/>
+          <a:ln>
+            <a:solidFill>
+              <a:schemeClr val="bg1"/>
+            </a:solidFill>
+          </a:ln>
+        </p:spPr>
+        <p:txBody>
+          <a:bodyPr wrap="square" rtlCol="0">
+            <a:spAutoFit/>
+          </a:bodyPr>
+          <a:lstStyle/>
+          <a:p>
+            <a:pPr algn="ctr"/>
+            <a:r>
+              <a:rPr lang="en-US" sz="2800" dirty="0"/>
+              <a:t>Update</a:t>
+            </a:r>
+            <a:endParaRPr lang="en-PH" sz="2800" dirty="0"/>
+          </a:p>
+        </p:txBody>
+      </p:sp>
+      <p:cxnSp>
+        <p:nvCxnSpPr>
+          <p:cNvPr id="26" name="Straight Connector 25">
+            <a:extLst>
+              <a:ext uri="{FF2B5EF4-FFF2-40B4-BE49-F238E27FC236}">
+                <a16:creationId xmlns:a16="http://schemas.microsoft.com/office/drawing/2014/main" id="{8BE64092-DDD5-5BBD-C887-85510B9BDC06}"/>
+              </a:ext>
+            </a:extLst>
+          </p:cNvPr>
+          <p:cNvCxnSpPr>
+            <a:stCxn id="2" idx="1"/>
+            <a:endCxn id="2" idx="3"/>
+          </p:cNvCxnSpPr>
+          <p:nvPr/>
+        </p:nvCxnSpPr>
+        <p:spPr>
+          <a:xfrm>
+            <a:off x="4616669" y="3246383"/>
+            <a:ext cx="3097925" cy="0"/>
+          </a:xfrm>
+          <a:prstGeom prst="line">
+            <a:avLst/>
+          </a:prstGeom>
+          <a:ln>
+            <a:solidFill>
+              <a:schemeClr val="bg1"/>
+            </a:solidFill>
+          </a:ln>
+        </p:spPr>
+        <p:style>
+          <a:lnRef idx="2">
+            <a:schemeClr val="accent1"/>
+          </a:lnRef>
+          <a:fillRef idx="0">
+            <a:schemeClr val="accent1"/>
+          </a:fillRef>
+          <a:effectRef idx="1">
+            <a:schemeClr val="accent1"/>
+          </a:effectRef>
+          <a:fontRef idx="minor">
+            <a:schemeClr val="tx1"/>
+          </a:fontRef>
+        </p:style>
+      </p:cxnSp>
+      <p:cxnSp>
+        <p:nvCxnSpPr>
+          <p:cNvPr id="27" name="Straight Connector 26">
+            <a:extLst>
+              <a:ext uri="{FF2B5EF4-FFF2-40B4-BE49-F238E27FC236}">
+                <a16:creationId xmlns:a16="http://schemas.microsoft.com/office/drawing/2014/main" id="{2D42D572-6059-13E8-87B5-508066B9523B}"/>
+              </a:ext>
+            </a:extLst>
+          </p:cNvPr>
+          <p:cNvCxnSpPr>
+            <a:cxnSpLocks/>
+            <a:stCxn id="2" idx="0"/>
+          </p:cNvCxnSpPr>
+          <p:nvPr/>
+        </p:nvCxnSpPr>
+        <p:spPr>
+          <a:xfrm flipH="1">
+            <a:off x="6165631" y="2638097"/>
+            <a:ext cx="1" cy="1302623"/>
+          </a:xfrm>
+          <a:prstGeom prst="line">
+            <a:avLst/>
+          </a:prstGeom>
+          <a:ln>
+            <a:solidFill>
+              <a:schemeClr val="bg1"/>
+            </a:solidFill>
+          </a:ln>
+        </p:spPr>
+        <p:style>
+          <a:lnRef idx="2">
+            <a:schemeClr val="accent1"/>
+          </a:lnRef>
+          <a:fillRef idx="0">
+            <a:schemeClr val="accent1"/>
+          </a:fillRef>
+          <a:effectRef idx="1">
+            <a:schemeClr val="accent1"/>
+          </a:effectRef>
+          <a:fontRef idx="minor">
+            <a:schemeClr val="tx1"/>
+          </a:fontRef>
+        </p:style>
+      </p:cxnSp>
+      <p:sp>
+        <p:nvSpPr>
+          <p:cNvPr id="30" name="TextBox 29">
+            <a:extLst>
+              <a:ext uri="{FF2B5EF4-FFF2-40B4-BE49-F238E27FC236}">
+                <a16:creationId xmlns:a16="http://schemas.microsoft.com/office/drawing/2014/main" id="{1FDC5E06-47CD-F703-F6B0-C8B61DDC14B9}"/>
+              </a:ext>
+            </a:extLst>
+          </p:cNvPr>
+          <p:cNvSpPr txBox="1"/>
+          <p:nvPr/>
+        </p:nvSpPr>
+        <p:spPr>
+          <a:xfrm>
+            <a:off x="5822731" y="2351045"/>
+            <a:ext cx="1891863" cy="215444"/>
+          </a:xfrm>
+          <a:prstGeom prst="rect">
+            <a:avLst/>
+          </a:prstGeom>
+          <a:noFill/>
+          <a:ln>
+            <a:solidFill>
+              <a:schemeClr val="tx1"/>
+            </a:solidFill>
+          </a:ln>
+        </p:spPr>
+        <p:txBody>
+          <a:bodyPr wrap="square" rtlCol="0">
+            <a:spAutoFit/>
+          </a:bodyPr>
+          <a:lstStyle/>
+          <a:p>
+            <a:endParaRPr lang="en-PH" sz="800" dirty="0"/>
           </a:p>
         </p:txBody>
       </p:sp>

</xml_diff>